<commit_message>
swapped azure logos with web logos to keep things consistent
</commit_message>
<xml_diff>
--- a/AddingWebApiToASPNETSite/AddingWebApiToASPNETSite.pptx
+++ b/AddingWebApiToASPNETSite/AddingWebApiToASPNETSite.pptx
@@ -54,16 +54,16 @@
       <p:regular r:id="rId41"/>
     </p:embeddedFont>
     <p:embeddedFont>
-      <p:font typeface="Segoe UI" pitchFamily="34" charset="0"/>
+      <p:font typeface="Segoe Light" pitchFamily="34" charset="0"/>
       <p:regular r:id="rId42"/>
-      <p:bold r:id="rId43"/>
-      <p:italic r:id="rId44"/>
-      <p:boldItalic r:id="rId45"/>
+      <p:italic r:id="rId43"/>
     </p:embeddedFont>
     <p:embeddedFont>
-      <p:font typeface="Segoe Light" pitchFamily="34" charset="0"/>
-      <p:regular r:id="rId46"/>
-      <p:italic r:id="rId47"/>
+      <p:font typeface="Segoe UI" pitchFamily="34" charset="0"/>
+      <p:regular r:id="rId44"/>
+      <p:bold r:id="rId45"/>
+      <p:italic r:id="rId46"/>
+      <p:boldItalic r:id="rId47"/>
     </p:embeddedFont>
     <p:embeddedFont>
       <p:font typeface="Consolas" pitchFamily="49" charset="0"/>
@@ -267,7 +267,7 @@
               <a:rPr lang="en-US" smtClean="0">
                 <a:latin typeface="Segoe UI" pitchFamily="34" charset="0"/>
               </a:rPr>
-              <a:t>4/5/2012</a:t>
+              <a:t>4/6/2012</a:t>
             </a:fld>
             <a:endParaRPr lang="en-US" dirty="0">
               <a:latin typeface="Segoe UI" pitchFamily="34" charset="0"/>
@@ -449,7 +449,7 @@
             <a:fld id="{CAE3F082-F902-42D8-A765-720E172C3194}" type="datetimeFigureOut">
               <a:rPr lang="en-US" smtClean="0"/>
               <a:pPr/>
-              <a:t>4/5/2012</a:t>
+              <a:t>4/6/2012</a:t>
             </a:fld>
             <a:endParaRPr lang="en-US" dirty="0"/>
           </a:p>
@@ -3554,45 +3554,115 @@
           </a:p>
         </p:txBody>
       </p:sp>
-      <p:pic>
-        <p:nvPicPr>
-          <p:cNvPr id="13" name="Picture 12"/>
-          <p:cNvPicPr>
-            <a:picLocks noChangeAspect="1"/>
-          </p:cNvPicPr>
+      <p:grpSp>
+        <p:nvGrpSpPr>
+          <p:cNvPr id="5" name="Group 4"/>
+          <p:cNvGrpSpPr/>
           <p:nvPr userDrawn="1"/>
-        </p:nvPicPr>
-        <p:blipFill>
-          <a:blip r:embed="rId3">
-            <a:extLst>
-              <a:ext uri="{BEBA8EAE-BF5A-486C-A8C5-ECC9F3942E4B}">
-                <a14:imgProps xmlns:a14="http://schemas.microsoft.com/office/drawing/2010/main">
-                  <a14:imgLayer r:embed="rId4">
-                    <a14:imgEffect>
-                      <a14:brightnessContrast bright="100000"/>
-                    </a14:imgEffect>
-                  </a14:imgLayer>
-                </a14:imgProps>
-              </a:ext>
-              <a:ext uri="{28A0092B-C50C-407E-A947-70E740481C1C}">
-                <a14:useLocalDpi xmlns:a14="http://schemas.microsoft.com/office/drawing/2010/main" val="0"/>
-              </a:ext>
-            </a:extLst>
-          </a:blip>
-          <a:stretch>
-            <a:fillRect/>
-          </a:stretch>
-        </p:blipFill>
-        <p:spPr>
+        </p:nvGrpSpPr>
+        <p:grpSpPr>
           <a:xfrm>
-            <a:off x="519113" y="228600"/>
-            <a:ext cx="2497827" cy="290338"/>
+            <a:off x="519113" y="241940"/>
+            <a:ext cx="2411374" cy="387798"/>
+            <a:chOff x="517525" y="5956427"/>
+            <a:chExt cx="1489796" cy="775597"/>
           </a:xfrm>
-          <a:prstGeom prst="rect">
-            <a:avLst/>
-          </a:prstGeom>
-        </p:spPr>
-      </p:pic>
+        </p:grpSpPr>
+        <p:sp>
+          <p:nvSpPr>
+            <p:cNvPr id="6" name="TextBox 5"/>
+            <p:cNvSpPr txBox="1"/>
+            <p:nvPr userDrawn="1"/>
+          </p:nvSpPr>
+          <p:spPr>
+            <a:xfrm>
+              <a:off x="517525" y="5956427"/>
+              <a:ext cx="1489796" cy="775597"/>
+            </a:xfrm>
+            <a:prstGeom prst="rect">
+              <a:avLst/>
+            </a:prstGeom>
+            <a:noFill/>
+          </p:spPr>
+          <p:txBody>
+            <a:bodyPr wrap="square" lIns="0" tIns="0" rIns="0" bIns="0" rtlCol="0">
+              <a:spAutoFit/>
+            </a:bodyPr>
+            <a:lstStyle/>
+            <a:p>
+              <a:pPr marL="0" indent="0">
+                <a:lnSpc>
+                  <a:spcPct val="90000"/>
+                </a:lnSpc>
+                <a:spcBef>
+                  <a:spcPct val="20000"/>
+                </a:spcBef>
+                <a:buSzPct val="80000"/>
+                <a:buFont typeface="Arial" pitchFamily="34" charset="0"/>
+                <a:buNone/>
+              </a:pPr>
+              <a:r>
+                <a:rPr lang="en-US" sz="2800" dirty="0" smtClean="0">
+                  <a:solidFill>
+                    <a:schemeClr val="bg1">
+                      <a:alpha val="99000"/>
+                    </a:schemeClr>
+                  </a:solidFill>
+                </a:rPr>
+                <a:t>Microsoft /web</a:t>
+              </a:r>
+              <a:endParaRPr lang="en-US" sz="2800" baseline="0" dirty="0">
+                <a:solidFill>
+                  <a:schemeClr val="bg1">
+                    <a:alpha val="99000"/>
+                  </a:schemeClr>
+                </a:solidFill>
+              </a:endParaRPr>
+            </a:p>
+          </p:txBody>
+        </p:sp>
+        <p:sp>
+          <p:nvSpPr>
+            <p:cNvPr id="8" name="Rectangle 7"/>
+            <p:cNvSpPr/>
+            <p:nvPr userDrawn="1"/>
+          </p:nvSpPr>
+          <p:spPr>
+            <a:xfrm>
+              <a:off x="1438350" y="6127087"/>
+              <a:ext cx="35653" cy="76944"/>
+            </a:xfrm>
+            <a:prstGeom prst="rect">
+              <a:avLst/>
+            </a:prstGeom>
+          </p:spPr>
+          <p:txBody>
+            <a:bodyPr wrap="none" lIns="0" tIns="0" rIns="0" bIns="0">
+              <a:spAutoFit/>
+            </a:bodyPr>
+            <a:lstStyle/>
+            <a:p>
+              <a:r>
+                <a:rPr lang="en-US" sz="500" baseline="0" dirty="0" smtClean="0">
+                  <a:solidFill>
+                    <a:schemeClr val="bg1">
+                      <a:alpha val="99000"/>
+                    </a:schemeClr>
+                  </a:solidFill>
+                </a:rPr>
+                <a:t>®</a:t>
+              </a:r>
+              <a:endParaRPr lang="en-US" sz="500" baseline="0" dirty="0">
+                <a:solidFill>
+                  <a:schemeClr val="bg1">
+                    <a:alpha val="99000"/>
+                  </a:schemeClr>
+                </a:solidFill>
+              </a:endParaRPr>
+            </a:p>
+          </p:txBody>
+        </p:sp>
+      </p:grpSp>
     </p:spTree>
     <p:extLst>
       <p:ext uri="{BB962C8B-B14F-4D97-AF65-F5344CB8AC3E}">
@@ -7431,45 +7501,115 @@
           </a:p>
         </p:txBody>
       </p:sp>
-      <p:pic>
-        <p:nvPicPr>
-          <p:cNvPr id="8" name="Picture 7"/>
-          <p:cNvPicPr>
-            <a:picLocks noChangeAspect="1"/>
-          </p:cNvPicPr>
+      <p:grpSp>
+        <p:nvGrpSpPr>
+          <p:cNvPr id="4" name="Group 3"/>
+          <p:cNvGrpSpPr/>
           <p:nvPr userDrawn="1"/>
-        </p:nvPicPr>
-        <p:blipFill>
-          <a:blip r:embed="rId3">
-            <a:extLst>
-              <a:ext uri="{BEBA8EAE-BF5A-486C-A8C5-ECC9F3942E4B}">
-                <a14:imgProps xmlns:a14="http://schemas.microsoft.com/office/drawing/2010/main">
-                  <a14:imgLayer r:embed="rId4">
-                    <a14:imgEffect>
-                      <a14:brightnessContrast bright="100000"/>
-                    </a14:imgEffect>
-                  </a14:imgLayer>
-                </a14:imgProps>
-              </a:ext>
-              <a:ext uri="{28A0092B-C50C-407E-A947-70E740481C1C}">
-                <a14:useLocalDpi xmlns:a14="http://schemas.microsoft.com/office/drawing/2010/main" val="0"/>
-              </a:ext>
-            </a:extLst>
-          </a:blip>
-          <a:stretch>
-            <a:fillRect/>
-          </a:stretch>
-        </p:blipFill>
-        <p:spPr>
+        </p:nvGrpSpPr>
+        <p:grpSpPr>
           <a:xfrm>
-            <a:off x="9161564" y="6338047"/>
-            <a:ext cx="2506561" cy="291353"/>
+            <a:off x="9264689" y="6225727"/>
+            <a:ext cx="2411374" cy="387798"/>
+            <a:chOff x="517525" y="5956427"/>
+            <a:chExt cx="1489796" cy="775597"/>
           </a:xfrm>
-          <a:prstGeom prst="rect">
-            <a:avLst/>
-          </a:prstGeom>
-        </p:spPr>
-      </p:pic>
+        </p:grpSpPr>
+        <p:sp>
+          <p:nvSpPr>
+            <p:cNvPr id="5" name="TextBox 4"/>
+            <p:cNvSpPr txBox="1"/>
+            <p:nvPr userDrawn="1"/>
+          </p:nvSpPr>
+          <p:spPr>
+            <a:xfrm>
+              <a:off x="517525" y="5956427"/>
+              <a:ext cx="1489796" cy="775597"/>
+            </a:xfrm>
+            <a:prstGeom prst="rect">
+              <a:avLst/>
+            </a:prstGeom>
+            <a:noFill/>
+          </p:spPr>
+          <p:txBody>
+            <a:bodyPr wrap="square" lIns="0" tIns="0" rIns="0" bIns="0" rtlCol="0">
+              <a:spAutoFit/>
+            </a:bodyPr>
+            <a:lstStyle/>
+            <a:p>
+              <a:pPr marL="0" indent="0">
+                <a:lnSpc>
+                  <a:spcPct val="90000"/>
+                </a:lnSpc>
+                <a:spcBef>
+                  <a:spcPct val="20000"/>
+                </a:spcBef>
+                <a:buSzPct val="80000"/>
+                <a:buFont typeface="Arial" pitchFamily="34" charset="0"/>
+                <a:buNone/>
+              </a:pPr>
+              <a:r>
+                <a:rPr lang="en-US" sz="2800" dirty="0" smtClean="0">
+                  <a:solidFill>
+                    <a:schemeClr val="bg1">
+                      <a:alpha val="99000"/>
+                    </a:schemeClr>
+                  </a:solidFill>
+                </a:rPr>
+                <a:t>Microsoft /web</a:t>
+              </a:r>
+              <a:endParaRPr lang="en-US" sz="2800" baseline="0" dirty="0">
+                <a:solidFill>
+                  <a:schemeClr val="bg1">
+                    <a:alpha val="99000"/>
+                  </a:schemeClr>
+                </a:solidFill>
+              </a:endParaRPr>
+            </a:p>
+          </p:txBody>
+        </p:sp>
+        <p:sp>
+          <p:nvSpPr>
+            <p:cNvPr id="6" name="Rectangle 5"/>
+            <p:cNvSpPr/>
+            <p:nvPr userDrawn="1"/>
+          </p:nvSpPr>
+          <p:spPr>
+            <a:xfrm>
+              <a:off x="1438350" y="6127087"/>
+              <a:ext cx="35653" cy="76944"/>
+            </a:xfrm>
+            <a:prstGeom prst="rect">
+              <a:avLst/>
+            </a:prstGeom>
+          </p:spPr>
+          <p:txBody>
+            <a:bodyPr wrap="none" lIns="0" tIns="0" rIns="0" bIns="0">
+              <a:spAutoFit/>
+            </a:bodyPr>
+            <a:lstStyle/>
+            <a:p>
+              <a:r>
+                <a:rPr lang="en-US" sz="500" baseline="0" dirty="0" smtClean="0">
+                  <a:solidFill>
+                    <a:schemeClr val="bg1">
+                      <a:alpha val="99000"/>
+                    </a:schemeClr>
+                  </a:solidFill>
+                </a:rPr>
+                <a:t>®</a:t>
+              </a:r>
+              <a:endParaRPr lang="en-US" sz="500" baseline="0" dirty="0">
+                <a:solidFill>
+                  <a:schemeClr val="bg1">
+                    <a:alpha val="99000"/>
+                  </a:schemeClr>
+                </a:solidFill>
+              </a:endParaRPr>
+            </a:p>
+          </p:txBody>
+        </p:sp>
+      </p:grpSp>
     </p:spTree>
     <p:extLst>
       <p:ext uri="{BB962C8B-B14F-4D97-AF65-F5344CB8AC3E}">
@@ -7615,7 +7755,19 @@
                 <a:latin typeface="Segoe UI" pitchFamily="34" charset="0"/>
                 <a:cs typeface="Arial" charset="0"/>
               </a:rPr>
-              <a:t>2011 Microsoft </a:t>
+              <a:t>2012 </a:t>
+            </a:r>
+            <a:r>
+              <a:rPr lang="en-US" sz="700" dirty="0" smtClean="0">
+                <a:solidFill>
+                  <a:schemeClr val="bg1">
+                    <a:alpha val="99000"/>
+                  </a:schemeClr>
+                </a:solidFill>
+                <a:latin typeface="Segoe UI" pitchFamily="34" charset="0"/>
+                <a:cs typeface="Arial" charset="0"/>
+              </a:rPr>
+              <a:t>Microsoft </a:t>
             </a:r>
             <a:r>
               <a:rPr lang="en-US" sz="700" dirty="0">
@@ -7872,45 +8024,115 @@
           </a:ln>
         </p:spPr>
       </p:pic>
-      <p:pic>
-        <p:nvPicPr>
-          <p:cNvPr id="7" name="Picture 6"/>
-          <p:cNvPicPr>
-            <a:picLocks noChangeAspect="1"/>
-          </p:cNvPicPr>
+      <p:grpSp>
+        <p:nvGrpSpPr>
+          <p:cNvPr id="6" name="Group 5"/>
+          <p:cNvGrpSpPr/>
           <p:nvPr userDrawn="1"/>
-        </p:nvPicPr>
-        <p:blipFill>
-          <a:blip r:embed="rId5">
-            <a:extLst>
-              <a:ext uri="{BEBA8EAE-BF5A-486C-A8C5-ECC9F3942E4B}">
-                <a14:imgProps xmlns:a14="http://schemas.microsoft.com/office/drawing/2010/main">
-                  <a14:imgLayer r:embed="rId6">
-                    <a14:imgEffect>
-                      <a14:brightnessContrast bright="100000"/>
-                    </a14:imgEffect>
-                  </a14:imgLayer>
-                </a14:imgProps>
-              </a:ext>
-              <a:ext uri="{28A0092B-C50C-407E-A947-70E740481C1C}">
-                <a14:useLocalDpi xmlns:a14="http://schemas.microsoft.com/office/drawing/2010/main" val="0"/>
-              </a:ext>
-            </a:extLst>
-          </a:blip>
-          <a:stretch>
-            <a:fillRect/>
-          </a:stretch>
-        </p:blipFill>
-        <p:spPr>
+        </p:nvGrpSpPr>
+        <p:grpSpPr>
           <a:xfrm>
-            <a:off x="519113" y="228600"/>
-            <a:ext cx="2497827" cy="290338"/>
+            <a:off x="519113" y="241940"/>
+            <a:ext cx="2411374" cy="387798"/>
+            <a:chOff x="517525" y="5956427"/>
+            <a:chExt cx="1489796" cy="775597"/>
           </a:xfrm>
-          <a:prstGeom prst="rect">
-            <a:avLst/>
-          </a:prstGeom>
-        </p:spPr>
-      </p:pic>
+        </p:grpSpPr>
+        <p:sp>
+          <p:nvSpPr>
+            <p:cNvPr id="8" name="TextBox 7"/>
+            <p:cNvSpPr txBox="1"/>
+            <p:nvPr userDrawn="1"/>
+          </p:nvSpPr>
+          <p:spPr>
+            <a:xfrm>
+              <a:off x="517525" y="5956427"/>
+              <a:ext cx="1489796" cy="775597"/>
+            </a:xfrm>
+            <a:prstGeom prst="rect">
+              <a:avLst/>
+            </a:prstGeom>
+            <a:noFill/>
+          </p:spPr>
+          <p:txBody>
+            <a:bodyPr wrap="square" lIns="0" tIns="0" rIns="0" bIns="0" rtlCol="0">
+              <a:spAutoFit/>
+            </a:bodyPr>
+            <a:lstStyle/>
+            <a:p>
+              <a:pPr marL="0" indent="0">
+                <a:lnSpc>
+                  <a:spcPct val="90000"/>
+                </a:lnSpc>
+                <a:spcBef>
+                  <a:spcPct val="20000"/>
+                </a:spcBef>
+                <a:buSzPct val="80000"/>
+                <a:buFont typeface="Arial" pitchFamily="34" charset="0"/>
+                <a:buNone/>
+              </a:pPr>
+              <a:r>
+                <a:rPr lang="en-US" sz="2800" dirty="0" smtClean="0">
+                  <a:solidFill>
+                    <a:schemeClr val="bg1">
+                      <a:alpha val="99000"/>
+                    </a:schemeClr>
+                  </a:solidFill>
+                </a:rPr>
+                <a:t>Microsoft /web</a:t>
+              </a:r>
+              <a:endParaRPr lang="en-US" sz="2800" baseline="0" dirty="0">
+                <a:solidFill>
+                  <a:schemeClr val="bg1">
+                    <a:alpha val="99000"/>
+                  </a:schemeClr>
+                </a:solidFill>
+              </a:endParaRPr>
+            </a:p>
+          </p:txBody>
+        </p:sp>
+        <p:sp>
+          <p:nvSpPr>
+            <p:cNvPr id="9" name="Rectangle 8"/>
+            <p:cNvSpPr/>
+            <p:nvPr userDrawn="1"/>
+          </p:nvSpPr>
+          <p:spPr>
+            <a:xfrm>
+              <a:off x="1438350" y="6127087"/>
+              <a:ext cx="35653" cy="76944"/>
+            </a:xfrm>
+            <a:prstGeom prst="rect">
+              <a:avLst/>
+            </a:prstGeom>
+          </p:spPr>
+          <p:txBody>
+            <a:bodyPr wrap="none" lIns="0" tIns="0" rIns="0" bIns="0">
+              <a:spAutoFit/>
+            </a:bodyPr>
+            <a:lstStyle/>
+            <a:p>
+              <a:r>
+                <a:rPr lang="en-US" sz="500" baseline="0" dirty="0" smtClean="0">
+                  <a:solidFill>
+                    <a:schemeClr val="bg1">
+                      <a:alpha val="99000"/>
+                    </a:schemeClr>
+                  </a:solidFill>
+                </a:rPr>
+                <a:t>®</a:t>
+              </a:r>
+              <a:endParaRPr lang="en-US" sz="500" baseline="0" dirty="0">
+                <a:solidFill>
+                  <a:schemeClr val="bg1">
+                    <a:alpha val="99000"/>
+                  </a:schemeClr>
+                </a:solidFill>
+              </a:endParaRPr>
+            </a:p>
+          </p:txBody>
+        </p:sp>
+      </p:grpSp>
     </p:spTree>
     <p:extLst>
       <p:ext uri="{BB962C8B-B14F-4D97-AF65-F5344CB8AC3E}">
@@ -16731,7 +16953,7 @@
           <a:graphicData uri="http://schemas.openxmlformats.org/presentationml/2006/ole">
             <mc:AlternateContent xmlns:mc="http://schemas.openxmlformats.org/markup-compatibility/2006">
               <mc:Choice xmlns:v="urn:schemas-microsoft-com:vml" Requires="v">
-                <p:oleObj spid="_x0000_s33840" name="think-cell Slide" r:id="rId6" imgW="270" imgH="270" progId="TCLayout.ActiveDocument.1">
+                <p:oleObj spid="_x0000_s33841" name="think-cell Slide" r:id="rId6" imgW="270" imgH="270" progId="TCLayout.ActiveDocument.1">
                   <p:embed/>
                 </p:oleObj>
               </mc:Choice>
@@ -16908,7 +17130,7 @@
           <a:graphicData uri="http://schemas.openxmlformats.org/presentationml/2006/ole">
             <mc:AlternateContent xmlns:mc="http://schemas.openxmlformats.org/markup-compatibility/2006">
               <mc:Choice xmlns:v="urn:schemas-microsoft-com:vml" Requires="v">
-                <p:oleObj spid="_x0000_s34869" name="think-cell Slide" r:id="rId7" imgW="270" imgH="270" progId="TCLayout.ActiveDocument.1">
+                <p:oleObj spid="_x0000_s34870" name="think-cell Slide" r:id="rId7" imgW="270" imgH="270" progId="TCLayout.ActiveDocument.1">
                   <p:embed/>
                 </p:oleObj>
               </mc:Choice>
@@ -18369,7 +18591,7 @@
           <a:graphicData uri="http://schemas.openxmlformats.org/presentationml/2006/ole">
             <mc:AlternateContent xmlns:mc="http://schemas.openxmlformats.org/markup-compatibility/2006">
               <mc:Choice xmlns:v="urn:schemas-microsoft-com:vml" Requires="v">
-                <p:oleObj spid="_x0000_s35893" name="think-cell Slide" r:id="rId7" imgW="270" imgH="270" progId="TCLayout.ActiveDocument.1">
+                <p:oleObj spid="_x0000_s35894" name="think-cell Slide" r:id="rId7" imgW="270" imgH="270" progId="TCLayout.ActiveDocument.1">
                   <p:embed/>
                 </p:oleObj>
               </mc:Choice>
@@ -19876,7 +20098,7 @@
           <a:graphicData uri="http://schemas.openxmlformats.org/presentationml/2006/ole">
             <mc:AlternateContent xmlns:mc="http://schemas.openxmlformats.org/markup-compatibility/2006">
               <mc:Choice xmlns:v="urn:schemas-microsoft-com:vml" Requires="v">
-                <p:oleObj spid="_x0000_s36913" name="think-cell Slide" r:id="rId6" imgW="270" imgH="270" progId="TCLayout.ActiveDocument.1">
+                <p:oleObj spid="_x0000_s36914" name="think-cell Slide" r:id="rId6" imgW="270" imgH="270" progId="TCLayout.ActiveDocument.1">
                   <p:embed/>
                 </p:oleObj>
               </mc:Choice>
@@ -20060,7 +20282,7 @@
           <a:graphicData uri="http://schemas.openxmlformats.org/presentationml/2006/ole">
             <mc:AlternateContent xmlns:mc="http://schemas.openxmlformats.org/markup-compatibility/2006">
               <mc:Choice xmlns:v="urn:schemas-microsoft-com:vml" Requires="v">
-                <p:oleObj spid="_x0000_s37941" name="think-cell Slide" r:id="rId7" imgW="270" imgH="270" progId="TCLayout.ActiveDocument.1">
+                <p:oleObj spid="_x0000_s37942" name="think-cell Slide" r:id="rId7" imgW="270" imgH="270" progId="TCLayout.ActiveDocument.1">
                   <p:embed/>
                 </p:oleObj>
               </mc:Choice>
@@ -20677,7 +20899,7 @@
           <a:graphicData uri="http://schemas.openxmlformats.org/presentationml/2006/ole">
             <mc:AlternateContent xmlns:mc="http://schemas.openxmlformats.org/markup-compatibility/2006">
               <mc:Choice xmlns:v="urn:schemas-microsoft-com:vml" Requires="v">
-                <p:oleObj spid="_x0000_s38965" name="think-cell Slide" r:id="rId7" imgW="270" imgH="270" progId="TCLayout.ActiveDocument.1">
+                <p:oleObj spid="_x0000_s38966" name="think-cell Slide" r:id="rId7" imgW="270" imgH="270" progId="TCLayout.ActiveDocument.1">
                   <p:embed/>
                 </p:oleObj>
               </mc:Choice>
@@ -21747,7 +21969,7 @@
           <a:graphicData uri="http://schemas.openxmlformats.org/presentationml/2006/ole">
             <mc:AlternateContent xmlns:mc="http://schemas.openxmlformats.org/markup-compatibility/2006">
               <mc:Choice xmlns:v="urn:schemas-microsoft-com:vml" Requires="v">
-                <p:oleObj spid="_x0000_s39985" name="think-cell Slide" r:id="rId5" imgW="270" imgH="270" progId="TCLayout.ActiveDocument.1">
+                <p:oleObj spid="_x0000_s39986" name="think-cell Slide" r:id="rId5" imgW="270" imgH="270" progId="TCLayout.ActiveDocument.1">
                   <p:embed/>
                 </p:oleObj>
               </mc:Choice>
@@ -21933,7 +22155,7 @@
           <a:graphicData uri="http://schemas.openxmlformats.org/presentationml/2006/ole">
             <mc:AlternateContent xmlns:mc="http://schemas.openxmlformats.org/markup-compatibility/2006">
               <mc:Choice xmlns:v="urn:schemas-microsoft-com:vml" Requires="v">
-                <p:oleObj spid="_x0000_s41013" name="think-cell Slide" r:id="rId7" imgW="270" imgH="270" progId="TCLayout.ActiveDocument.1">
+                <p:oleObj spid="_x0000_s41014" name="think-cell Slide" r:id="rId7" imgW="270" imgH="270" progId="TCLayout.ActiveDocument.1">
                   <p:embed/>
                 </p:oleObj>
               </mc:Choice>
@@ -22632,7 +22854,7 @@
           <a:graphicData uri="http://schemas.openxmlformats.org/presentationml/2006/ole">
             <mc:AlternateContent xmlns:mc="http://schemas.openxmlformats.org/markup-compatibility/2006">
               <mc:Choice xmlns:v="urn:schemas-microsoft-com:vml" Requires="v">
-                <p:oleObj spid="_x0000_s42037" name="think-cell Slide" r:id="rId7" imgW="270" imgH="270" progId="TCLayout.ActiveDocument.1">
+                <p:oleObj spid="_x0000_s42038" name="think-cell Slide" r:id="rId7" imgW="270" imgH="270" progId="TCLayout.ActiveDocument.1">
                   <p:embed/>
                 </p:oleObj>
               </mc:Choice>
@@ -24829,7 +25051,7 @@
           <a:graphicData uri="http://schemas.openxmlformats.org/presentationml/2006/ole">
             <mc:AlternateContent xmlns:mc="http://schemas.openxmlformats.org/markup-compatibility/2006">
               <mc:Choice xmlns:v="urn:schemas-microsoft-com:vml" Requires="v">
-                <p:oleObj spid="_x0000_s43055" name="think-cell Slide" r:id="rId6" imgW="270" imgH="270" progId="TCLayout.ActiveDocument.1">
+                <p:oleObj spid="_x0000_s43056" name="think-cell Slide" r:id="rId6" imgW="270" imgH="270" progId="TCLayout.ActiveDocument.1">
                   <p:embed/>
                 </p:oleObj>
               </mc:Choice>
@@ -25013,7 +25235,7 @@
           <a:graphicData uri="http://schemas.openxmlformats.org/presentationml/2006/ole">
             <mc:AlternateContent xmlns:mc="http://schemas.openxmlformats.org/markup-compatibility/2006">
               <mc:Choice xmlns:v="urn:schemas-microsoft-com:vml" Requires="v">
-                <p:oleObj spid="_x0000_s59434" name="think-cell Slide" r:id="rId5" imgW="270" imgH="270" progId="TCLayout.ActiveDocument.1">
+                <p:oleObj spid="_x0000_s59435" name="think-cell Slide" r:id="rId5" imgW="270" imgH="270" progId="TCLayout.ActiveDocument.1">
                   <p:embed/>
                 </p:oleObj>
               </mc:Choice>
@@ -25070,15 +25292,18 @@
           <a:p>
             <a:r>
               <a:rPr lang="en-US" dirty="0" smtClean="0"/>
-              <a:t>Building </a:t>
+              <a:t>Building a Service Layer </a:t>
             </a:r>
             <a:r>
               <a:rPr lang="en-US" dirty="0" smtClean="0"/>
-              <a:t>a Service Layer with</a:t>
+              <a:t/>
             </a:r>
+            <a:br>
+              <a:rPr lang="en-US" dirty="0" smtClean="0"/>
+            </a:br>
             <a:r>
               <a:rPr lang="en-US" dirty="0" smtClean="0"/>
-              <a:t> </a:t>
+              <a:t>with </a:t>
             </a:r>
             <a:r>
               <a:rPr lang="en-US" dirty="0" smtClean="0"/>
@@ -25197,7 +25422,7 @@
           <a:graphicData uri="http://schemas.openxmlformats.org/presentationml/2006/ole">
             <mc:AlternateContent xmlns:mc="http://schemas.openxmlformats.org/markup-compatibility/2006">
               <mc:Choice xmlns:v="urn:schemas-microsoft-com:vml" Requires="v">
-                <p:oleObj spid="_x0000_s44082" name="think-cell Slide" r:id="rId7" imgW="270" imgH="270" progId="TCLayout.ActiveDocument.1">
+                <p:oleObj spid="_x0000_s44083" name="think-cell Slide" r:id="rId7" imgW="270" imgH="270" progId="TCLayout.ActiveDocument.1">
                   <p:embed/>
                 </p:oleObj>
               </mc:Choice>
@@ -28146,7 +28371,7 @@
           <a:graphicData uri="http://schemas.openxmlformats.org/presentationml/2006/ole">
             <mc:AlternateContent xmlns:mc="http://schemas.openxmlformats.org/markup-compatibility/2006">
               <mc:Choice xmlns:v="urn:schemas-microsoft-com:vml" Requires="v">
-                <p:oleObj spid="_x0000_s45105" name="think-cell Slide" r:id="rId5" imgW="270" imgH="270" progId="TCLayout.ActiveDocument.1">
+                <p:oleObj spid="_x0000_s45106" name="think-cell Slide" r:id="rId5" imgW="270" imgH="270" progId="TCLayout.ActiveDocument.1">
                   <p:embed/>
                 </p:oleObj>
               </mc:Choice>
@@ -28701,7 +28926,7 @@
           <a:graphicData uri="http://schemas.openxmlformats.org/presentationml/2006/ole">
             <mc:AlternateContent xmlns:mc="http://schemas.openxmlformats.org/markup-compatibility/2006">
               <mc:Choice xmlns:v="urn:schemas-microsoft-com:vml" Requires="v">
-                <p:oleObj spid="_x0000_s47156" name="think-cell Slide" r:id="rId7" imgW="270" imgH="270" progId="TCLayout.ActiveDocument.1">
+                <p:oleObj spid="_x0000_s47157" name="think-cell Slide" r:id="rId7" imgW="270" imgH="270" progId="TCLayout.ActiveDocument.1">
                   <p:embed/>
                 </p:oleObj>
               </mc:Choice>
@@ -29683,7 +29908,7 @@
           <a:graphicData uri="http://schemas.openxmlformats.org/presentationml/2006/ole">
             <mc:AlternateContent xmlns:mc="http://schemas.openxmlformats.org/markup-compatibility/2006">
               <mc:Choice xmlns:v="urn:schemas-microsoft-com:vml" Requires="v">
-                <p:oleObj spid="_x0000_s48177" name="think-cell Slide" r:id="rId5" imgW="270" imgH="270" progId="TCLayout.ActiveDocument.1">
+                <p:oleObj spid="_x0000_s48178" name="think-cell Slide" r:id="rId5" imgW="270" imgH="270" progId="TCLayout.ActiveDocument.1">
                   <p:embed/>
                 </p:oleObj>
               </mc:Choice>
@@ -29861,7 +30086,7 @@
           <a:graphicData uri="http://schemas.openxmlformats.org/presentationml/2006/ole">
             <mc:AlternateContent xmlns:mc="http://schemas.openxmlformats.org/markup-compatibility/2006">
               <mc:Choice xmlns:v="urn:schemas-microsoft-com:vml" Requires="v">
-                <p:oleObj spid="_x0000_s49201" name="think-cell Slide" r:id="rId7" imgW="270" imgH="270" progId="TCLayout.ActiveDocument.1">
+                <p:oleObj spid="_x0000_s49202" name="think-cell Slide" r:id="rId7" imgW="270" imgH="270" progId="TCLayout.ActiveDocument.1">
                   <p:embed/>
                 </p:oleObj>
               </mc:Choice>
@@ -31027,7 +31252,7 @@
           <a:graphicData uri="http://schemas.openxmlformats.org/presentationml/2006/ole">
             <mc:AlternateContent xmlns:mc="http://schemas.openxmlformats.org/markup-compatibility/2006">
               <mc:Choice xmlns:v="urn:schemas-microsoft-com:vml" Requires="v">
-                <p:oleObj spid="_x0000_s50225" name="think-cell Slide" r:id="rId5" imgW="270" imgH="270" progId="TCLayout.ActiveDocument.1">
+                <p:oleObj spid="_x0000_s50226" name="think-cell Slide" r:id="rId5" imgW="270" imgH="270" progId="TCLayout.ActiveDocument.1">
                   <p:embed/>
                 </p:oleObj>
               </mc:Choice>
@@ -31797,7 +32022,7 @@
           <a:graphicData uri="http://schemas.openxmlformats.org/presentationml/2006/ole">
             <mc:AlternateContent xmlns:mc="http://schemas.openxmlformats.org/markup-compatibility/2006">
               <mc:Choice xmlns:v="urn:schemas-microsoft-com:vml" Requires="v">
-                <p:oleObj spid="_x0000_s51250" name="think-cell Slide" r:id="rId7" imgW="270" imgH="270" progId="TCLayout.ActiveDocument.1">
+                <p:oleObj spid="_x0000_s51251" name="think-cell Slide" r:id="rId7" imgW="270" imgH="270" progId="TCLayout.ActiveDocument.1">
                   <p:embed/>
                 </p:oleObj>
               </mc:Choice>
@@ -32272,7 +32497,7 @@
           <a:graphicData uri="http://schemas.openxmlformats.org/presentationml/2006/ole">
             <mc:AlternateContent xmlns:mc="http://schemas.openxmlformats.org/markup-compatibility/2006">
               <mc:Choice xmlns:v="urn:schemas-microsoft-com:vml" Requires="v">
-                <p:oleObj spid="_x0000_s52274" name="think-cell Slide" r:id="rId5" imgW="270" imgH="270" progId="TCLayout.ActiveDocument.1">
+                <p:oleObj spid="_x0000_s52275" name="think-cell Slide" r:id="rId5" imgW="270" imgH="270" progId="TCLayout.ActiveDocument.1">
                   <p:embed/>
                 </p:oleObj>
               </mc:Choice>
@@ -32742,7 +32967,7 @@
           <a:graphicData uri="http://schemas.openxmlformats.org/presentationml/2006/ole">
             <mc:AlternateContent xmlns:mc="http://schemas.openxmlformats.org/markup-compatibility/2006">
               <mc:Choice xmlns:v="urn:schemas-microsoft-com:vml" Requires="v">
-                <p:oleObj spid="_x0000_s60434" name="think-cell Slide" r:id="rId6" imgW="270" imgH="270" progId="TCLayout.ActiveDocument.1">
+                <p:oleObj spid="_x0000_s60435" name="think-cell Slide" r:id="rId6" imgW="270" imgH="270" progId="TCLayout.ActiveDocument.1">
                   <p:embed/>
                 </p:oleObj>
               </mc:Choice>
@@ -32943,7 +33168,7 @@
           <a:graphicData uri="http://schemas.openxmlformats.org/presentationml/2006/ole">
             <mc:AlternateContent xmlns:mc="http://schemas.openxmlformats.org/markup-compatibility/2006">
               <mc:Choice xmlns:v="urn:schemas-microsoft-com:vml" Requires="v">
-                <p:oleObj spid="_x0000_s53297" name="think-cell Slide" r:id="rId8" imgW="270" imgH="270" progId="TCLayout.ActiveDocument.1">
+                <p:oleObj spid="_x0000_s53298" name="think-cell Slide" r:id="rId8" imgW="270" imgH="270" progId="TCLayout.ActiveDocument.1">
                   <p:embed/>
                 </p:oleObj>
               </mc:Choice>
@@ -33462,7 +33687,7 @@
           <a:graphicData uri="http://schemas.openxmlformats.org/presentationml/2006/ole">
             <mc:AlternateContent xmlns:mc="http://schemas.openxmlformats.org/markup-compatibility/2006">
               <mc:Choice xmlns:v="urn:schemas-microsoft-com:vml" Requires="v">
-                <p:oleObj spid="_x0000_s23599" name="think-cell Slide" r:id="rId7" imgW="270" imgH="270" progId="TCLayout.ActiveDocument.1">
+                <p:oleObj spid="_x0000_s23600" name="think-cell Slide" r:id="rId7" imgW="270" imgH="270" progId="TCLayout.ActiveDocument.1">
                   <p:embed/>
                 </p:oleObj>
               </mc:Choice>
@@ -33647,7 +33872,7 @@
           <a:graphicData uri="http://schemas.openxmlformats.org/presentationml/2006/ole">
             <mc:AlternateContent xmlns:mc="http://schemas.openxmlformats.org/markup-compatibility/2006">
               <mc:Choice xmlns:v="urn:schemas-microsoft-com:vml" Requires="v">
-                <p:oleObj spid="_x0000_s55346" name="think-cell Slide" r:id="rId6" imgW="270" imgH="270" progId="TCLayout.ActiveDocument.1">
+                <p:oleObj spid="_x0000_s55347" name="think-cell Slide" r:id="rId6" imgW="270" imgH="270" progId="TCLayout.ActiveDocument.1">
                   <p:embed/>
                 </p:oleObj>
               </mc:Choice>
@@ -34724,7 +34949,7 @@
           <a:graphicData uri="http://schemas.openxmlformats.org/presentationml/2006/ole">
             <mc:AlternateContent xmlns:mc="http://schemas.openxmlformats.org/markup-compatibility/2006">
               <mc:Choice xmlns:v="urn:schemas-microsoft-com:vml" Requires="v">
-                <p:oleObj spid="_x0000_s2099" name="think-cell Slide" r:id="rId10" imgW="270" imgH="270" progId="TCLayout.ActiveDocument.1">
+                <p:oleObj spid="_x0000_s2100" name="think-cell Slide" r:id="rId10" imgW="270" imgH="270" progId="TCLayout.ActiveDocument.1">
                   <p:embed/>
                 </p:oleObj>
               </mc:Choice>
@@ -35625,7 +35850,7 @@
           <a:graphicData uri="http://schemas.openxmlformats.org/presentationml/2006/ole">
             <mc:AlternateContent xmlns:mc="http://schemas.openxmlformats.org/markup-compatibility/2006">
               <mc:Choice xmlns:v="urn:schemas-microsoft-com:vml" Requires="v">
-                <p:oleObj spid="_x0000_s57393" name="think-cell Slide" r:id="rId6" imgW="270" imgH="270" progId="TCLayout.ActiveDocument.1">
+                <p:oleObj spid="_x0000_s57394" name="think-cell Slide" r:id="rId6" imgW="270" imgH="270" progId="TCLayout.ActiveDocument.1">
                   <p:embed/>
                 </p:oleObj>
               </mc:Choice>
@@ -36107,7 +36332,7 @@
           <a:graphicData uri="http://schemas.openxmlformats.org/presentationml/2006/ole">
             <mc:AlternateContent xmlns:mc="http://schemas.openxmlformats.org/markup-compatibility/2006">
               <mc:Choice xmlns:v="urn:schemas-microsoft-com:vml" Requires="v">
-                <p:oleObj spid="_x0000_s58414" name="think-cell Slide" r:id="rId5" imgW="270" imgH="270" progId="TCLayout.ActiveDocument.1">
+                <p:oleObj spid="_x0000_s58415" name="think-cell Slide" r:id="rId5" imgW="270" imgH="270" progId="TCLayout.ActiveDocument.1">
                   <p:embed/>
                 </p:oleObj>
               </mc:Choice>
@@ -36286,7 +36511,7 @@
           <a:graphicData uri="http://schemas.openxmlformats.org/presentationml/2006/ole">
             <mc:AlternateContent xmlns:mc="http://schemas.openxmlformats.org/markup-compatibility/2006">
               <mc:Choice xmlns:v="urn:schemas-microsoft-com:vml" Requires="v">
-                <p:oleObj spid="_x0000_s25649" name="think-cell Slide" r:id="rId5" imgW="270" imgH="270" progId="TCLayout.ActiveDocument.1">
+                <p:oleObj spid="_x0000_s25650" name="think-cell Slide" r:id="rId5" imgW="270" imgH="270" progId="TCLayout.ActiveDocument.1">
                   <p:embed/>
                 </p:oleObj>
               </mc:Choice>
@@ -38212,7 +38437,7 @@
           <a:graphicData uri="http://schemas.openxmlformats.org/presentationml/2006/ole">
             <mc:AlternateContent xmlns:mc="http://schemas.openxmlformats.org/markup-compatibility/2006">
               <mc:Choice xmlns:v="urn:schemas-microsoft-com:vml" Requires="v">
-                <p:oleObj spid="_x0000_s29750" name="think-cell Slide" r:id="rId7" imgW="270" imgH="270" progId="TCLayout.ActiveDocument.1">
+                <p:oleObj spid="_x0000_s29751" name="think-cell Slide" r:id="rId7" imgW="270" imgH="270" progId="TCLayout.ActiveDocument.1">
                   <p:embed/>
                 </p:oleObj>
               </mc:Choice>
@@ -40318,7 +40543,7 @@
           <a:graphicData uri="http://schemas.openxmlformats.org/presentationml/2006/ole">
             <mc:AlternateContent xmlns:mc="http://schemas.openxmlformats.org/markup-compatibility/2006">
               <mc:Choice xmlns:v="urn:schemas-microsoft-com:vml" Requires="v">
-                <p:oleObj spid="_x0000_s30769" name="think-cell Slide" r:id="rId6" imgW="270" imgH="270" progId="TCLayout.ActiveDocument.1">
+                <p:oleObj spid="_x0000_s30770" name="think-cell Slide" r:id="rId6" imgW="270" imgH="270" progId="TCLayout.ActiveDocument.1">
                   <p:embed/>
                 </p:oleObj>
               </mc:Choice>
@@ -40495,7 +40720,7 @@
           <a:graphicData uri="http://schemas.openxmlformats.org/presentationml/2006/ole">
             <mc:AlternateContent xmlns:mc="http://schemas.openxmlformats.org/markup-compatibility/2006">
               <mc:Choice xmlns:v="urn:schemas-microsoft-com:vml" Requires="v">
-                <p:oleObj spid="_x0000_s31796" name="think-cell Slide" r:id="rId7" imgW="270" imgH="270" progId="TCLayout.ActiveDocument.1">
+                <p:oleObj spid="_x0000_s31797" name="think-cell Slide" r:id="rId7" imgW="270" imgH="270" progId="TCLayout.ActiveDocument.1">
                   <p:embed/>
                 </p:oleObj>
               </mc:Choice>
@@ -41268,7 +41493,7 @@
           <a:graphicData uri="http://schemas.openxmlformats.org/presentationml/2006/ole">
             <mc:AlternateContent xmlns:mc="http://schemas.openxmlformats.org/markup-compatibility/2006">
               <mc:Choice xmlns:v="urn:schemas-microsoft-com:vml" Requires="v">
-                <p:oleObj spid="_x0000_s32821" name="think-cell Slide" r:id="rId7" imgW="270" imgH="270" progId="TCLayout.ActiveDocument.1">
+                <p:oleObj spid="_x0000_s32822" name="think-cell Slide" r:id="rId7" imgW="270" imgH="270" progId="TCLayout.ActiveDocument.1">
                   <p:embed/>
                 </p:oleObj>
               </mc:Choice>
@@ -43726,6 +43951,17 @@
 </file>
 
 <file path=customXml/item1.xml><?xml version="1.0" encoding="utf-8"?>
+<p:properties xmlns:p="http://schemas.microsoft.com/office/2006/metadata/properties" xmlns:xsi="http://www.w3.org/2001/XMLSchema-instance" xmlns:pc="http://schemas.microsoft.com/office/infopath/2007/PartnerControls">
+  <documentManagement>
+    <TaxKeywordTaxHTField xmlns="230e9df3-be65-4c73-a93b-d1236ebd677e">
+      <Terms xmlns="http://schemas.microsoft.com/office/infopath/2007/PartnerControls"/>
+    </TaxKeywordTaxHTField>
+    <TaxCatchAll xmlns="230e9df3-be65-4c73-a93b-d1236ebd677e"/>
+  </documentManagement>
+</p:properties>
+</file>
+
+<file path=customXml/item2.xml><?xml version="1.0" encoding="utf-8"?>
 <ct:contentTypeSchema xmlns:ct="http://schemas.microsoft.com/office/2006/metadata/contentType" xmlns:ma="http://schemas.microsoft.com/office/2006/metadata/properties/metaAttributes" ct:_="" ma:_="" ma:contentTypeName="Document" ma:contentTypeID="0x010100CA05B43BE68FE54B90DD26FDFB72BB05" ma:contentTypeVersion="0" ma:contentTypeDescription="Create a new document." ma:contentTypeScope="" ma:versionID="6df1bece345c1749bd9b91e82fa4a03a">
   <xsd:schema xmlns:xsd="http://www.w3.org/2001/XMLSchema" xmlns:xs="http://www.w3.org/2001/XMLSchema" xmlns:p="http://schemas.microsoft.com/office/2006/metadata/properties" xmlns:ns2="230e9df3-be65-4c73-a93b-d1236ebd677e" targetNamespace="http://schemas.microsoft.com/office/2006/metadata/properties" ma:root="true" ma:fieldsID="e317b0b832c9845d3aae3abd1bb0954e" ns2:_="">
     <xsd:import namespace="230e9df3-be65-4c73-a93b-d1236ebd677e"/>
@@ -43877,17 +44113,6 @@
 </ct:contentTypeSchema>
 </file>
 
-<file path=customXml/item2.xml><?xml version="1.0" encoding="utf-8"?>
-<p:properties xmlns:p="http://schemas.microsoft.com/office/2006/metadata/properties" xmlns:xsi="http://www.w3.org/2001/XMLSchema-instance" xmlns:pc="http://schemas.microsoft.com/office/infopath/2007/PartnerControls">
-  <documentManagement>
-    <TaxKeywordTaxHTField xmlns="230e9df3-be65-4c73-a93b-d1236ebd677e">
-      <Terms xmlns="http://schemas.microsoft.com/office/infopath/2007/PartnerControls"/>
-    </TaxKeywordTaxHTField>
-    <TaxCatchAll xmlns="230e9df3-be65-4c73-a93b-d1236ebd677e"/>
-  </documentManagement>
-</p:properties>
-</file>
-
 <file path=customXml/item3.xml><?xml version="1.0" encoding="utf-8"?>
 <?mso-contentType ?>
 <FormTemplates xmlns="http://schemas.microsoft.com/sharepoint/v3/contenttype/forms">
@@ -43898,6 +44123,22 @@
 </file>
 
 <file path=customXml/itemProps1.xml><?xml version="1.0" encoding="utf-8"?>
+<ds:datastoreItem xmlns:ds="http://schemas.openxmlformats.org/officeDocument/2006/customXml" ds:itemID="{69B2F97D-0457-4986-9734-D03EB073C5EA}">
+  <ds:schemaRefs>
+    <ds:schemaRef ds:uri="http://schemas.openxmlformats.org/package/2006/metadata/core-properties"/>
+    <ds:schemaRef ds:uri="http://schemas.microsoft.com/office/2006/metadata/properties"/>
+    <ds:schemaRef ds:uri="http://purl.org/dc/elements/1.1/"/>
+    <ds:schemaRef ds:uri="http://purl.org/dc/dcmitype/"/>
+    <ds:schemaRef ds:uri="http://www.w3.org/XML/1998/namespace"/>
+    <ds:schemaRef ds:uri="http://schemas.microsoft.com/office/2006/documentManagement/types"/>
+    <ds:schemaRef ds:uri="230e9df3-be65-4c73-a93b-d1236ebd677e"/>
+    <ds:schemaRef ds:uri="http://schemas.microsoft.com/office/infopath/2007/PartnerControls"/>
+    <ds:schemaRef ds:uri="http://purl.org/dc/terms/"/>
+  </ds:schemaRefs>
+</ds:datastoreItem>
+</file>
+
+<file path=customXml/itemProps2.xml><?xml version="1.0" encoding="utf-8"?>
 <ds:datastoreItem xmlns:ds="http://schemas.openxmlformats.org/officeDocument/2006/customXml" ds:itemID="{8F590144-748D-417B-8B69-088F107B0F98}">
   <ds:schemaRefs>
     <ds:schemaRef ds:uri="http://schemas.microsoft.com/office/2006/metadata/contentType"/>
@@ -43915,22 +44156,6 @@
 </ds:datastoreItem>
 </file>
 
-<file path=customXml/itemProps2.xml><?xml version="1.0" encoding="utf-8"?>
-<ds:datastoreItem xmlns:ds="http://schemas.openxmlformats.org/officeDocument/2006/customXml" ds:itemID="{69B2F97D-0457-4986-9734-D03EB073C5EA}">
-  <ds:schemaRefs>
-    <ds:schemaRef ds:uri="http://purl.org/dc/terms/"/>
-    <ds:schemaRef ds:uri="http://purl.org/dc/elements/1.1/"/>
-    <ds:schemaRef ds:uri="http://www.w3.org/XML/1998/namespace"/>
-    <ds:schemaRef ds:uri="http://schemas.openxmlformats.org/package/2006/metadata/core-properties"/>
-    <ds:schemaRef ds:uri="http://schemas.microsoft.com/office/infopath/2007/PartnerControls"/>
-    <ds:schemaRef ds:uri="http://purl.org/dc/dcmitype/"/>
-    <ds:schemaRef ds:uri="http://schemas.microsoft.com/office/2006/documentManagement/types"/>
-    <ds:schemaRef ds:uri="230e9df3-be65-4c73-a93b-d1236ebd677e"/>
-    <ds:schemaRef ds:uri="http://schemas.microsoft.com/office/2006/metadata/properties"/>
-  </ds:schemaRefs>
-</ds:datastoreItem>
-</file>
-
 <file path=customXml/itemProps3.xml><?xml version="1.0" encoding="utf-8"?>
 <ds:datastoreItem xmlns:ds="http://schemas.openxmlformats.org/officeDocument/2006/customXml" ds:itemID="{B882D8D6-9D38-4159-A398-AAC3689D3D7C}">
   <ds:schemaRefs>

</xml_diff>

<commit_message>
fixed error on slide per jon
</commit_message>
<xml_diff>
--- a/AddingWebApiToASPNETSite/AddingWebApiToASPNETSite.pptx
+++ b/AddingWebApiToASPNETSite/AddingWebApiToASPNETSite.pptx
@@ -267,7 +267,7 @@
               <a:rPr lang="en-US" smtClean="0">
                 <a:latin typeface="Segoe UI" pitchFamily="34" charset="0"/>
               </a:rPr>
-              <a:t>4/6/2012</a:t>
+              <a:t>4/24/2012</a:t>
             </a:fld>
             <a:endParaRPr lang="en-US" dirty="0">
               <a:latin typeface="Segoe UI" pitchFamily="34" charset="0"/>
@@ -449,7 +449,7 @@
             <a:fld id="{CAE3F082-F902-42D8-A765-720E172C3194}" type="datetimeFigureOut">
               <a:rPr lang="en-US" smtClean="0"/>
               <a:pPr/>
-              <a:t>4/6/2012</a:t>
+              <a:t>4/24/2012</a:t>
             </a:fld>
             <a:endParaRPr lang="en-US" dirty="0"/>
           </a:p>
@@ -7755,19 +7755,7 @@
                 <a:latin typeface="Segoe UI" pitchFamily="34" charset="0"/>
                 <a:cs typeface="Arial" charset="0"/>
               </a:rPr>
-              <a:t>2012 </a:t>
-            </a:r>
-            <a:r>
-              <a:rPr lang="en-US" sz="700" dirty="0" smtClean="0">
-                <a:solidFill>
-                  <a:schemeClr val="bg1">
-                    <a:alpha val="99000"/>
-                  </a:schemeClr>
-                </a:solidFill>
-                <a:latin typeface="Segoe UI" pitchFamily="34" charset="0"/>
-                <a:cs typeface="Arial" charset="0"/>
-              </a:rPr>
-              <a:t>Microsoft </a:t>
+              <a:t>2012 Microsoft </a:t>
             </a:r>
             <a:r>
               <a:rPr lang="en-US" sz="700" dirty="0">
@@ -16953,7 +16941,7 @@
           <a:graphicData uri="http://schemas.openxmlformats.org/presentationml/2006/ole">
             <mc:AlternateContent xmlns:mc="http://schemas.openxmlformats.org/markup-compatibility/2006">
               <mc:Choice xmlns:v="urn:schemas-microsoft-com:vml" Requires="v">
-                <p:oleObj spid="_x0000_s33841" name="think-cell Slide" r:id="rId6" imgW="270" imgH="270" progId="TCLayout.ActiveDocument.1">
+                <p:oleObj spid="_x0000_s33842" name="think-cell Slide" r:id="rId6" imgW="270" imgH="270" progId="TCLayout.ActiveDocument.1">
                   <p:embed/>
                 </p:oleObj>
               </mc:Choice>
@@ -17130,7 +17118,7 @@
           <a:graphicData uri="http://schemas.openxmlformats.org/presentationml/2006/ole">
             <mc:AlternateContent xmlns:mc="http://schemas.openxmlformats.org/markup-compatibility/2006">
               <mc:Choice xmlns:v="urn:schemas-microsoft-com:vml" Requires="v">
-                <p:oleObj spid="_x0000_s34870" name="think-cell Slide" r:id="rId7" imgW="270" imgH="270" progId="TCLayout.ActiveDocument.1">
+                <p:oleObj spid="_x0000_s34871" name="think-cell Slide" r:id="rId7" imgW="270" imgH="270" progId="TCLayout.ActiveDocument.1">
                   <p:embed/>
                 </p:oleObj>
               </mc:Choice>
@@ -18591,7 +18579,7 @@
           <a:graphicData uri="http://schemas.openxmlformats.org/presentationml/2006/ole">
             <mc:AlternateContent xmlns:mc="http://schemas.openxmlformats.org/markup-compatibility/2006">
               <mc:Choice xmlns:v="urn:schemas-microsoft-com:vml" Requires="v">
-                <p:oleObj spid="_x0000_s35894" name="think-cell Slide" r:id="rId7" imgW="270" imgH="270" progId="TCLayout.ActiveDocument.1">
+                <p:oleObj spid="_x0000_s35895" name="think-cell Slide" r:id="rId7" imgW="270" imgH="270" progId="TCLayout.ActiveDocument.1">
                   <p:embed/>
                 </p:oleObj>
               </mc:Choice>
@@ -20098,7 +20086,7 @@
           <a:graphicData uri="http://schemas.openxmlformats.org/presentationml/2006/ole">
             <mc:AlternateContent xmlns:mc="http://schemas.openxmlformats.org/markup-compatibility/2006">
               <mc:Choice xmlns:v="urn:schemas-microsoft-com:vml" Requires="v">
-                <p:oleObj spid="_x0000_s36914" name="think-cell Slide" r:id="rId6" imgW="270" imgH="270" progId="TCLayout.ActiveDocument.1">
+                <p:oleObj spid="_x0000_s36915" name="think-cell Slide" r:id="rId6" imgW="270" imgH="270" progId="TCLayout.ActiveDocument.1">
                   <p:embed/>
                 </p:oleObj>
               </mc:Choice>
@@ -20282,7 +20270,7 @@
           <a:graphicData uri="http://schemas.openxmlformats.org/presentationml/2006/ole">
             <mc:AlternateContent xmlns:mc="http://schemas.openxmlformats.org/markup-compatibility/2006">
               <mc:Choice xmlns:v="urn:schemas-microsoft-com:vml" Requires="v">
-                <p:oleObj spid="_x0000_s37942" name="think-cell Slide" r:id="rId7" imgW="270" imgH="270" progId="TCLayout.ActiveDocument.1">
+                <p:oleObj spid="_x0000_s37943" name="think-cell Slide" r:id="rId7" imgW="270" imgH="270" progId="TCLayout.ActiveDocument.1">
                   <p:embed/>
                 </p:oleObj>
               </mc:Choice>
@@ -20899,7 +20887,7 @@
           <a:graphicData uri="http://schemas.openxmlformats.org/presentationml/2006/ole">
             <mc:AlternateContent xmlns:mc="http://schemas.openxmlformats.org/markup-compatibility/2006">
               <mc:Choice xmlns:v="urn:schemas-microsoft-com:vml" Requires="v">
-                <p:oleObj spid="_x0000_s38966" name="think-cell Slide" r:id="rId7" imgW="270" imgH="270" progId="TCLayout.ActiveDocument.1">
+                <p:oleObj spid="_x0000_s38967" name="think-cell Slide" r:id="rId7" imgW="270" imgH="270" progId="TCLayout.ActiveDocument.1">
                   <p:embed/>
                 </p:oleObj>
               </mc:Choice>
@@ -21969,7 +21957,7 @@
           <a:graphicData uri="http://schemas.openxmlformats.org/presentationml/2006/ole">
             <mc:AlternateContent xmlns:mc="http://schemas.openxmlformats.org/markup-compatibility/2006">
               <mc:Choice xmlns:v="urn:schemas-microsoft-com:vml" Requires="v">
-                <p:oleObj spid="_x0000_s39986" name="think-cell Slide" r:id="rId5" imgW="270" imgH="270" progId="TCLayout.ActiveDocument.1">
+                <p:oleObj spid="_x0000_s39987" name="think-cell Slide" r:id="rId5" imgW="270" imgH="270" progId="TCLayout.ActiveDocument.1">
                   <p:embed/>
                 </p:oleObj>
               </mc:Choice>
@@ -22155,7 +22143,7 @@
           <a:graphicData uri="http://schemas.openxmlformats.org/presentationml/2006/ole">
             <mc:AlternateContent xmlns:mc="http://schemas.openxmlformats.org/markup-compatibility/2006">
               <mc:Choice xmlns:v="urn:schemas-microsoft-com:vml" Requires="v">
-                <p:oleObj spid="_x0000_s41014" name="think-cell Slide" r:id="rId7" imgW="270" imgH="270" progId="TCLayout.ActiveDocument.1">
+                <p:oleObj spid="_x0000_s41015" name="think-cell Slide" r:id="rId7" imgW="270" imgH="270" progId="TCLayout.ActiveDocument.1">
                   <p:embed/>
                 </p:oleObj>
               </mc:Choice>
@@ -22854,7 +22842,7 @@
           <a:graphicData uri="http://schemas.openxmlformats.org/presentationml/2006/ole">
             <mc:AlternateContent xmlns:mc="http://schemas.openxmlformats.org/markup-compatibility/2006">
               <mc:Choice xmlns:v="urn:schemas-microsoft-com:vml" Requires="v">
-                <p:oleObj spid="_x0000_s42038" name="think-cell Slide" r:id="rId7" imgW="270" imgH="270" progId="TCLayout.ActiveDocument.1">
+                <p:oleObj spid="_x0000_s42039" name="think-cell Slide" r:id="rId7" imgW="270" imgH="270" progId="TCLayout.ActiveDocument.1">
                   <p:embed/>
                 </p:oleObj>
               </mc:Choice>
@@ -25051,7 +25039,7 @@
           <a:graphicData uri="http://schemas.openxmlformats.org/presentationml/2006/ole">
             <mc:AlternateContent xmlns:mc="http://schemas.openxmlformats.org/markup-compatibility/2006">
               <mc:Choice xmlns:v="urn:schemas-microsoft-com:vml" Requires="v">
-                <p:oleObj spid="_x0000_s43056" name="think-cell Slide" r:id="rId6" imgW="270" imgH="270" progId="TCLayout.ActiveDocument.1">
+                <p:oleObj spid="_x0000_s43057" name="think-cell Slide" r:id="rId6" imgW="270" imgH="270" progId="TCLayout.ActiveDocument.1">
                   <p:embed/>
                 </p:oleObj>
               </mc:Choice>
@@ -25235,7 +25223,7 @@
           <a:graphicData uri="http://schemas.openxmlformats.org/presentationml/2006/ole">
             <mc:AlternateContent xmlns:mc="http://schemas.openxmlformats.org/markup-compatibility/2006">
               <mc:Choice xmlns:v="urn:schemas-microsoft-com:vml" Requires="v">
-                <p:oleObj spid="_x0000_s59435" name="think-cell Slide" r:id="rId5" imgW="270" imgH="270" progId="TCLayout.ActiveDocument.1">
+                <p:oleObj spid="_x0000_s59436" name="think-cell Slide" r:id="rId5" imgW="270" imgH="270" progId="TCLayout.ActiveDocument.1">
                   <p:embed/>
                 </p:oleObj>
               </mc:Choice>
@@ -25294,20 +25282,12 @@
               <a:rPr lang="en-US" dirty="0" smtClean="0"/>
               <a:t>Building a Service Layer </a:t>
             </a:r>
-            <a:r>
-              <a:rPr lang="en-US" dirty="0" smtClean="0"/>
-              <a:t/>
-            </a:r>
             <a:br>
               <a:rPr lang="en-US" dirty="0" smtClean="0"/>
             </a:br>
             <a:r>
               <a:rPr lang="en-US" dirty="0" smtClean="0"/>
-              <a:t>with </a:t>
-            </a:r>
-            <a:r>
-              <a:rPr lang="en-US" dirty="0" smtClean="0"/>
-              <a:t>ASP.NET Web API</a:t>
+              <a:t>with ASP.NET Web API</a:t>
             </a:r>
             <a:endParaRPr lang="en-US" dirty="0"/>
           </a:p>
@@ -25422,7 +25402,7 @@
           <a:graphicData uri="http://schemas.openxmlformats.org/presentationml/2006/ole">
             <mc:AlternateContent xmlns:mc="http://schemas.openxmlformats.org/markup-compatibility/2006">
               <mc:Choice xmlns:v="urn:schemas-microsoft-com:vml" Requires="v">
-                <p:oleObj spid="_x0000_s44083" name="think-cell Slide" r:id="rId7" imgW="270" imgH="270" progId="TCLayout.ActiveDocument.1">
+                <p:oleObj spid="_x0000_s44084" name="think-cell Slide" r:id="rId7" imgW="270" imgH="270" progId="TCLayout.ActiveDocument.1">
                   <p:embed/>
                 </p:oleObj>
               </mc:Choice>
@@ -28371,7 +28351,7 @@
           <a:graphicData uri="http://schemas.openxmlformats.org/presentationml/2006/ole">
             <mc:AlternateContent xmlns:mc="http://schemas.openxmlformats.org/markup-compatibility/2006">
               <mc:Choice xmlns:v="urn:schemas-microsoft-com:vml" Requires="v">
-                <p:oleObj spid="_x0000_s45106" name="think-cell Slide" r:id="rId5" imgW="270" imgH="270" progId="TCLayout.ActiveDocument.1">
+                <p:oleObj spid="_x0000_s45107" name="think-cell Slide" r:id="rId5" imgW="270" imgH="270" progId="TCLayout.ActiveDocument.1">
                   <p:embed/>
                 </p:oleObj>
               </mc:Choice>
@@ -28926,7 +28906,7 @@
           <a:graphicData uri="http://schemas.openxmlformats.org/presentationml/2006/ole">
             <mc:AlternateContent xmlns:mc="http://schemas.openxmlformats.org/markup-compatibility/2006">
               <mc:Choice xmlns:v="urn:schemas-microsoft-com:vml" Requires="v">
-                <p:oleObj spid="_x0000_s47157" name="think-cell Slide" r:id="rId7" imgW="270" imgH="270" progId="TCLayout.ActiveDocument.1">
+                <p:oleObj spid="_x0000_s47158" name="think-cell Slide" r:id="rId7" imgW="270" imgH="270" progId="TCLayout.ActiveDocument.1">
                   <p:embed/>
                 </p:oleObj>
               </mc:Choice>
@@ -29908,7 +29888,7 @@
           <a:graphicData uri="http://schemas.openxmlformats.org/presentationml/2006/ole">
             <mc:AlternateContent xmlns:mc="http://schemas.openxmlformats.org/markup-compatibility/2006">
               <mc:Choice xmlns:v="urn:schemas-microsoft-com:vml" Requires="v">
-                <p:oleObj spid="_x0000_s48178" name="think-cell Slide" r:id="rId5" imgW="270" imgH="270" progId="TCLayout.ActiveDocument.1">
+                <p:oleObj spid="_x0000_s48179" name="think-cell Slide" r:id="rId5" imgW="270" imgH="270" progId="TCLayout.ActiveDocument.1">
                   <p:embed/>
                 </p:oleObj>
               </mc:Choice>
@@ -30086,7 +30066,7 @@
           <a:graphicData uri="http://schemas.openxmlformats.org/presentationml/2006/ole">
             <mc:AlternateContent xmlns:mc="http://schemas.openxmlformats.org/markup-compatibility/2006">
               <mc:Choice xmlns:v="urn:schemas-microsoft-com:vml" Requires="v">
-                <p:oleObj spid="_x0000_s49202" name="think-cell Slide" r:id="rId7" imgW="270" imgH="270" progId="TCLayout.ActiveDocument.1">
+                <p:oleObj spid="_x0000_s49203" name="think-cell Slide" r:id="rId7" imgW="270" imgH="270" progId="TCLayout.ActiveDocument.1">
                   <p:embed/>
                 </p:oleObj>
               </mc:Choice>
@@ -31252,7 +31232,7 @@
           <a:graphicData uri="http://schemas.openxmlformats.org/presentationml/2006/ole">
             <mc:AlternateContent xmlns:mc="http://schemas.openxmlformats.org/markup-compatibility/2006">
               <mc:Choice xmlns:v="urn:schemas-microsoft-com:vml" Requires="v">
-                <p:oleObj spid="_x0000_s50226" name="think-cell Slide" r:id="rId5" imgW="270" imgH="270" progId="TCLayout.ActiveDocument.1">
+                <p:oleObj spid="_x0000_s50227" name="think-cell Slide" r:id="rId5" imgW="270" imgH="270" progId="TCLayout.ActiveDocument.1">
                   <p:embed/>
                 </p:oleObj>
               </mc:Choice>
@@ -32022,7 +32002,7 @@
           <a:graphicData uri="http://schemas.openxmlformats.org/presentationml/2006/ole">
             <mc:AlternateContent xmlns:mc="http://schemas.openxmlformats.org/markup-compatibility/2006">
               <mc:Choice xmlns:v="urn:schemas-microsoft-com:vml" Requires="v">
-                <p:oleObj spid="_x0000_s51251" name="think-cell Slide" r:id="rId7" imgW="270" imgH="270" progId="TCLayout.ActiveDocument.1">
+                <p:oleObj spid="_x0000_s51252" name="think-cell Slide" r:id="rId7" imgW="270" imgH="270" progId="TCLayout.ActiveDocument.1">
                   <p:embed/>
                 </p:oleObj>
               </mc:Choice>
@@ -32497,7 +32477,7 @@
           <a:graphicData uri="http://schemas.openxmlformats.org/presentationml/2006/ole">
             <mc:AlternateContent xmlns:mc="http://schemas.openxmlformats.org/markup-compatibility/2006">
               <mc:Choice xmlns:v="urn:schemas-microsoft-com:vml" Requires="v">
-                <p:oleObj spid="_x0000_s52275" name="think-cell Slide" r:id="rId5" imgW="270" imgH="270" progId="TCLayout.ActiveDocument.1">
+                <p:oleObj spid="_x0000_s52276" name="think-cell Slide" r:id="rId5" imgW="270" imgH="270" progId="TCLayout.ActiveDocument.1">
                   <p:embed/>
                 </p:oleObj>
               </mc:Choice>
@@ -32967,7 +32947,7 @@
           <a:graphicData uri="http://schemas.openxmlformats.org/presentationml/2006/ole">
             <mc:AlternateContent xmlns:mc="http://schemas.openxmlformats.org/markup-compatibility/2006">
               <mc:Choice xmlns:v="urn:schemas-microsoft-com:vml" Requires="v">
-                <p:oleObj spid="_x0000_s60435" name="think-cell Slide" r:id="rId6" imgW="270" imgH="270" progId="TCLayout.ActiveDocument.1">
+                <p:oleObj spid="_x0000_s60436" name="think-cell Slide" r:id="rId6" imgW="270" imgH="270" progId="TCLayout.ActiveDocument.1">
                   <p:embed/>
                 </p:oleObj>
               </mc:Choice>
@@ -33168,7 +33148,7 @@
           <a:graphicData uri="http://schemas.openxmlformats.org/presentationml/2006/ole">
             <mc:AlternateContent xmlns:mc="http://schemas.openxmlformats.org/markup-compatibility/2006">
               <mc:Choice xmlns:v="urn:schemas-microsoft-com:vml" Requires="v">
-                <p:oleObj spid="_x0000_s53298" name="think-cell Slide" r:id="rId8" imgW="270" imgH="270" progId="TCLayout.ActiveDocument.1">
+                <p:oleObj spid="_x0000_s53299" name="think-cell Slide" r:id="rId8" imgW="270" imgH="270" progId="TCLayout.ActiveDocument.1">
                   <p:embed/>
                 </p:oleObj>
               </mc:Choice>
@@ -33687,7 +33667,7 @@
           <a:graphicData uri="http://schemas.openxmlformats.org/presentationml/2006/ole">
             <mc:AlternateContent xmlns:mc="http://schemas.openxmlformats.org/markup-compatibility/2006">
               <mc:Choice xmlns:v="urn:schemas-microsoft-com:vml" Requires="v">
-                <p:oleObj spid="_x0000_s23600" name="think-cell Slide" r:id="rId7" imgW="270" imgH="270" progId="TCLayout.ActiveDocument.1">
+                <p:oleObj spid="_x0000_s23601" name="think-cell Slide" r:id="rId7" imgW="270" imgH="270" progId="TCLayout.ActiveDocument.1">
                   <p:embed/>
                 </p:oleObj>
               </mc:Choice>
@@ -33872,7 +33852,7 @@
           <a:graphicData uri="http://schemas.openxmlformats.org/presentationml/2006/ole">
             <mc:AlternateContent xmlns:mc="http://schemas.openxmlformats.org/markup-compatibility/2006">
               <mc:Choice xmlns:v="urn:schemas-microsoft-com:vml" Requires="v">
-                <p:oleObj spid="_x0000_s55347" name="think-cell Slide" r:id="rId6" imgW="270" imgH="270" progId="TCLayout.ActiveDocument.1">
+                <p:oleObj spid="_x0000_s55348" name="think-cell Slide" r:id="rId6" imgW="270" imgH="270" progId="TCLayout.ActiveDocument.1">
                   <p:embed/>
                 </p:oleObj>
               </mc:Choice>
@@ -34949,7 +34929,7 @@
           <a:graphicData uri="http://schemas.openxmlformats.org/presentationml/2006/ole">
             <mc:AlternateContent xmlns:mc="http://schemas.openxmlformats.org/markup-compatibility/2006">
               <mc:Choice xmlns:v="urn:schemas-microsoft-com:vml" Requires="v">
-                <p:oleObj spid="_x0000_s2100" name="think-cell Slide" r:id="rId10" imgW="270" imgH="270" progId="TCLayout.ActiveDocument.1">
+                <p:oleObj spid="_x0000_s2101" name="think-cell Slide" r:id="rId10" imgW="270" imgH="270" progId="TCLayout.ActiveDocument.1">
                   <p:embed/>
                 </p:oleObj>
               </mc:Choice>
@@ -35850,7 +35830,7 @@
           <a:graphicData uri="http://schemas.openxmlformats.org/presentationml/2006/ole">
             <mc:AlternateContent xmlns:mc="http://schemas.openxmlformats.org/markup-compatibility/2006">
               <mc:Choice xmlns:v="urn:schemas-microsoft-com:vml" Requires="v">
-                <p:oleObj spid="_x0000_s57394" name="think-cell Slide" r:id="rId6" imgW="270" imgH="270" progId="TCLayout.ActiveDocument.1">
+                <p:oleObj spid="_x0000_s57395" name="think-cell Slide" r:id="rId6" imgW="270" imgH="270" progId="TCLayout.ActiveDocument.1">
                   <p:embed/>
                 </p:oleObj>
               </mc:Choice>
@@ -36332,7 +36312,7 @@
           <a:graphicData uri="http://schemas.openxmlformats.org/presentationml/2006/ole">
             <mc:AlternateContent xmlns:mc="http://schemas.openxmlformats.org/markup-compatibility/2006">
               <mc:Choice xmlns:v="urn:schemas-microsoft-com:vml" Requires="v">
-                <p:oleObj spid="_x0000_s58415" name="think-cell Slide" r:id="rId5" imgW="270" imgH="270" progId="TCLayout.ActiveDocument.1">
+                <p:oleObj spid="_x0000_s58416" name="think-cell Slide" r:id="rId5" imgW="270" imgH="270" progId="TCLayout.ActiveDocument.1">
                   <p:embed/>
                 </p:oleObj>
               </mc:Choice>
@@ -36511,7 +36491,7 @@
           <a:graphicData uri="http://schemas.openxmlformats.org/presentationml/2006/ole">
             <mc:AlternateContent xmlns:mc="http://schemas.openxmlformats.org/markup-compatibility/2006">
               <mc:Choice xmlns:v="urn:schemas-microsoft-com:vml" Requires="v">
-                <p:oleObj spid="_x0000_s25650" name="think-cell Slide" r:id="rId5" imgW="270" imgH="270" progId="TCLayout.ActiveDocument.1">
+                <p:oleObj spid="_x0000_s25651" name="think-cell Slide" r:id="rId5" imgW="270" imgH="270" progId="TCLayout.ActiveDocument.1">
                   <p:embed/>
                 </p:oleObj>
               </mc:Choice>
@@ -38437,7 +38417,7 @@
           <a:graphicData uri="http://schemas.openxmlformats.org/presentationml/2006/ole">
             <mc:AlternateContent xmlns:mc="http://schemas.openxmlformats.org/markup-compatibility/2006">
               <mc:Choice xmlns:v="urn:schemas-microsoft-com:vml" Requires="v">
-                <p:oleObj spid="_x0000_s29751" name="think-cell Slide" r:id="rId7" imgW="270" imgH="270" progId="TCLayout.ActiveDocument.1">
+                <p:oleObj spid="_x0000_s29752" name="think-cell Slide" r:id="rId7" imgW="270" imgH="270" progId="TCLayout.ActiveDocument.1">
                   <p:embed/>
                 </p:oleObj>
               </mc:Choice>
@@ -38554,7 +38534,19 @@
               <a:rPr lang="en-US" sz="4000" dirty="0" smtClean="0">
                 <a:latin typeface="Segoe UI Light" pitchFamily="34" charset="0"/>
               </a:rPr>
-              <a:t>Allow browser clients to </a:t>
+              <a:t>Allow browser </a:t>
+            </a:r>
+            <a:r>
+              <a:rPr lang="en-US" sz="4000" smtClean="0">
+                <a:latin typeface="Segoe UI Light" pitchFamily="34" charset="0"/>
+              </a:rPr>
+              <a:t>or other clients </a:t>
+            </a:r>
+            <a:r>
+              <a:rPr lang="en-US" sz="4000" dirty="0" smtClean="0">
+                <a:latin typeface="Segoe UI Light" pitchFamily="34" charset="0"/>
+              </a:rPr>
+              <a:t>to </a:t>
             </a:r>
             <a:br>
               <a:rPr lang="en-US" sz="4000" dirty="0" smtClean="0">
@@ -40543,7 +40535,7 @@
           <a:graphicData uri="http://schemas.openxmlformats.org/presentationml/2006/ole">
             <mc:AlternateContent xmlns:mc="http://schemas.openxmlformats.org/markup-compatibility/2006">
               <mc:Choice xmlns:v="urn:schemas-microsoft-com:vml" Requires="v">
-                <p:oleObj spid="_x0000_s30770" name="think-cell Slide" r:id="rId6" imgW="270" imgH="270" progId="TCLayout.ActiveDocument.1">
+                <p:oleObj spid="_x0000_s30771" name="think-cell Slide" r:id="rId6" imgW="270" imgH="270" progId="TCLayout.ActiveDocument.1">
                   <p:embed/>
                 </p:oleObj>
               </mc:Choice>
@@ -40720,7 +40712,7 @@
           <a:graphicData uri="http://schemas.openxmlformats.org/presentationml/2006/ole">
             <mc:AlternateContent xmlns:mc="http://schemas.openxmlformats.org/markup-compatibility/2006">
               <mc:Choice xmlns:v="urn:schemas-microsoft-com:vml" Requires="v">
-                <p:oleObj spid="_x0000_s31797" name="think-cell Slide" r:id="rId7" imgW="270" imgH="270" progId="TCLayout.ActiveDocument.1">
+                <p:oleObj spid="_x0000_s31798" name="think-cell Slide" r:id="rId7" imgW="270" imgH="270" progId="TCLayout.ActiveDocument.1">
                   <p:embed/>
                 </p:oleObj>
               </mc:Choice>
@@ -41493,7 +41485,7 @@
           <a:graphicData uri="http://schemas.openxmlformats.org/presentationml/2006/ole">
             <mc:AlternateContent xmlns:mc="http://schemas.openxmlformats.org/markup-compatibility/2006">
               <mc:Choice xmlns:v="urn:schemas-microsoft-com:vml" Requires="v">
-                <p:oleObj spid="_x0000_s32822" name="think-cell Slide" r:id="rId7" imgW="270" imgH="270" progId="TCLayout.ActiveDocument.1">
+                <p:oleObj spid="_x0000_s32823" name="think-cell Slide" r:id="rId7" imgW="270" imgH="270" progId="TCLayout.ActiveDocument.1">
                   <p:embed/>
                 </p:oleObj>
               </mc:Choice>
@@ -43951,17 +43943,6 @@
 </file>
 
 <file path=customXml/item1.xml><?xml version="1.0" encoding="utf-8"?>
-<p:properties xmlns:p="http://schemas.microsoft.com/office/2006/metadata/properties" xmlns:xsi="http://www.w3.org/2001/XMLSchema-instance" xmlns:pc="http://schemas.microsoft.com/office/infopath/2007/PartnerControls">
-  <documentManagement>
-    <TaxKeywordTaxHTField xmlns="230e9df3-be65-4c73-a93b-d1236ebd677e">
-      <Terms xmlns="http://schemas.microsoft.com/office/infopath/2007/PartnerControls"/>
-    </TaxKeywordTaxHTField>
-    <TaxCatchAll xmlns="230e9df3-be65-4c73-a93b-d1236ebd677e"/>
-  </documentManagement>
-</p:properties>
-</file>
-
-<file path=customXml/item2.xml><?xml version="1.0" encoding="utf-8"?>
 <ct:contentTypeSchema xmlns:ct="http://schemas.microsoft.com/office/2006/metadata/contentType" xmlns:ma="http://schemas.microsoft.com/office/2006/metadata/properties/metaAttributes" ct:_="" ma:_="" ma:contentTypeName="Document" ma:contentTypeID="0x010100CA05B43BE68FE54B90DD26FDFB72BB05" ma:contentTypeVersion="0" ma:contentTypeDescription="Create a new document." ma:contentTypeScope="" ma:versionID="6df1bece345c1749bd9b91e82fa4a03a">
   <xsd:schema xmlns:xsd="http://www.w3.org/2001/XMLSchema" xmlns:xs="http://www.w3.org/2001/XMLSchema" xmlns:p="http://schemas.microsoft.com/office/2006/metadata/properties" xmlns:ns2="230e9df3-be65-4c73-a93b-d1236ebd677e" targetNamespace="http://schemas.microsoft.com/office/2006/metadata/properties" ma:root="true" ma:fieldsID="e317b0b832c9845d3aae3abd1bb0954e" ns2:_="">
     <xsd:import namespace="230e9df3-be65-4c73-a93b-d1236ebd677e"/>
@@ -44113,6 +44094,17 @@
 </ct:contentTypeSchema>
 </file>
 
+<file path=customXml/item2.xml><?xml version="1.0" encoding="utf-8"?>
+<p:properties xmlns:p="http://schemas.microsoft.com/office/2006/metadata/properties" xmlns:xsi="http://www.w3.org/2001/XMLSchema-instance" xmlns:pc="http://schemas.microsoft.com/office/infopath/2007/PartnerControls">
+  <documentManagement>
+    <TaxKeywordTaxHTField xmlns="230e9df3-be65-4c73-a93b-d1236ebd677e">
+      <Terms xmlns="http://schemas.microsoft.com/office/infopath/2007/PartnerControls"/>
+    </TaxKeywordTaxHTField>
+    <TaxCatchAll xmlns="230e9df3-be65-4c73-a93b-d1236ebd677e"/>
+  </documentManagement>
+</p:properties>
+</file>
+
 <file path=customXml/item3.xml><?xml version="1.0" encoding="utf-8"?>
 <?mso-contentType ?>
 <FormTemplates xmlns="http://schemas.microsoft.com/sharepoint/v3/contenttype/forms">
@@ -44123,22 +44115,6 @@
 </file>
 
 <file path=customXml/itemProps1.xml><?xml version="1.0" encoding="utf-8"?>
-<ds:datastoreItem xmlns:ds="http://schemas.openxmlformats.org/officeDocument/2006/customXml" ds:itemID="{69B2F97D-0457-4986-9734-D03EB073C5EA}">
-  <ds:schemaRefs>
-    <ds:schemaRef ds:uri="http://schemas.openxmlformats.org/package/2006/metadata/core-properties"/>
-    <ds:schemaRef ds:uri="http://schemas.microsoft.com/office/2006/metadata/properties"/>
-    <ds:schemaRef ds:uri="http://purl.org/dc/elements/1.1/"/>
-    <ds:schemaRef ds:uri="http://purl.org/dc/dcmitype/"/>
-    <ds:schemaRef ds:uri="http://www.w3.org/XML/1998/namespace"/>
-    <ds:schemaRef ds:uri="http://schemas.microsoft.com/office/2006/documentManagement/types"/>
-    <ds:schemaRef ds:uri="230e9df3-be65-4c73-a93b-d1236ebd677e"/>
-    <ds:schemaRef ds:uri="http://schemas.microsoft.com/office/infopath/2007/PartnerControls"/>
-    <ds:schemaRef ds:uri="http://purl.org/dc/terms/"/>
-  </ds:schemaRefs>
-</ds:datastoreItem>
-</file>
-
-<file path=customXml/itemProps2.xml><?xml version="1.0" encoding="utf-8"?>
 <ds:datastoreItem xmlns:ds="http://schemas.openxmlformats.org/officeDocument/2006/customXml" ds:itemID="{8F590144-748D-417B-8B69-088F107B0F98}">
   <ds:schemaRefs>
     <ds:schemaRef ds:uri="http://schemas.microsoft.com/office/2006/metadata/contentType"/>
@@ -44156,6 +44132,22 @@
 </ds:datastoreItem>
 </file>
 
+<file path=customXml/itemProps2.xml><?xml version="1.0" encoding="utf-8"?>
+<ds:datastoreItem xmlns:ds="http://schemas.openxmlformats.org/officeDocument/2006/customXml" ds:itemID="{69B2F97D-0457-4986-9734-D03EB073C5EA}">
+  <ds:schemaRefs>
+    <ds:schemaRef ds:uri="http://schemas.openxmlformats.org/package/2006/metadata/core-properties"/>
+    <ds:schemaRef ds:uri="http://schemas.microsoft.com/office/2006/metadata/properties"/>
+    <ds:schemaRef ds:uri="http://purl.org/dc/elements/1.1/"/>
+    <ds:schemaRef ds:uri="http://purl.org/dc/dcmitype/"/>
+    <ds:schemaRef ds:uri="http://www.w3.org/XML/1998/namespace"/>
+    <ds:schemaRef ds:uri="http://schemas.microsoft.com/office/2006/documentManagement/types"/>
+    <ds:schemaRef ds:uri="230e9df3-be65-4c73-a93b-d1236ebd677e"/>
+    <ds:schemaRef ds:uri="http://schemas.microsoft.com/office/infopath/2007/PartnerControls"/>
+    <ds:schemaRef ds:uri="http://purl.org/dc/terms/"/>
+  </ds:schemaRefs>
+</ds:datastoreItem>
+</file>
+
 <file path=customXml/itemProps3.xml><?xml version="1.0" encoding="utf-8"?>
 <ds:datastoreItem xmlns:ds="http://schemas.openxmlformats.org/officeDocument/2006/customXml" ds:itemID="{B882D8D6-9D38-4159-A398-AAC3689D3D7C}">
   <ds:schemaRefs>

</xml_diff>